<commit_message>
sesion 2 y actualización
</commit_message>
<xml_diff>
--- a/My courses/Networks/Sesion1.pptx
+++ b/My courses/Networks/Sesion1.pptx
@@ -510,7 +510,7 @@
           <a:p>
             <a:fld id="{B2E8E9B9-1E63-4F39-B8D0-582BC410424E}" type="datetimeFigureOut">
               <a:rPr lang="es-CO" smtClean="0"/>
-              <a:t>31/07/2018</a:t>
+              <a:t>2/08/2018</a:t>
             </a:fld>
             <a:endParaRPr lang="es-CO"/>
           </a:p>
@@ -1265,7 +1265,7 @@
           <a:p>
             <a:fld id="{7686B5EC-4FB1-41B7-8670-53AEB2EB1F31}" type="datetime1">
               <a:rPr lang="es-CO" smtClean="0"/>
-              <a:t>31/07/2018</a:t>
+              <a:t>2/08/2018</a:t>
             </a:fld>
             <a:endParaRPr lang="es-CO"/>
           </a:p>
@@ -1444,7 +1444,7 @@
           <a:p>
             <a:fld id="{62E4560F-08EB-4591-90FD-AD5C1DC1F912}" type="datetime1">
               <a:rPr lang="es-CO" smtClean="0"/>
-              <a:t>31/07/2018</a:t>
+              <a:t>2/08/2018</a:t>
             </a:fld>
             <a:endParaRPr lang="es-CO"/>
           </a:p>
@@ -1624,7 +1624,7 @@
           <a:p>
             <a:fld id="{46C3FAB3-FA39-4B21-835A-5E3984399770}" type="datetime1">
               <a:rPr lang="es-CO" smtClean="0"/>
-              <a:t>31/07/2018</a:t>
+              <a:t>2/08/2018</a:t>
             </a:fld>
             <a:endParaRPr lang="es-CO"/>
           </a:p>
@@ -1794,7 +1794,7 @@
           <a:p>
             <a:fld id="{CE59C47A-37D4-4CD3-863B-E2426EE6CC8B}" type="datetime1">
               <a:rPr lang="es-CO" smtClean="0"/>
-              <a:t>31/07/2018</a:t>
+              <a:t>2/08/2018</a:t>
             </a:fld>
             <a:endParaRPr lang="es-CO"/>
           </a:p>
@@ -2107,7 +2107,7 @@
           <a:p>
             <a:fld id="{52D3C397-871A-486A-9EDA-A50E2540B44C}" type="datetime1">
               <a:rPr lang="es-CO" smtClean="0"/>
-              <a:t>31/07/2018</a:t>
+              <a:t>2/08/2018</a:t>
             </a:fld>
             <a:endParaRPr lang="es-CO"/>
           </a:p>
@@ -2493,7 +2493,7 @@
           <a:p>
             <a:fld id="{F5F208A2-D046-4CB3-B907-9AFEC6B4C15E}" type="datetime1">
               <a:rPr lang="es-CO" smtClean="0"/>
-              <a:t>31/07/2018</a:t>
+              <a:t>2/08/2018</a:t>
             </a:fld>
             <a:endParaRPr lang="es-CO"/>
           </a:p>
@@ -2927,7 +2927,7 @@
           <a:p>
             <a:fld id="{170543B1-7E09-44FA-9D8B-F7555B771CB0}" type="datetime1">
               <a:rPr lang="es-CO" smtClean="0"/>
-              <a:t>31/07/2018</a:t>
+              <a:t>2/08/2018</a:t>
             </a:fld>
             <a:endParaRPr lang="es-CO"/>
           </a:p>
@@ -3045,7 +3045,7 @@
           <a:p>
             <a:fld id="{08F7ECEC-DB93-4B02-ABB3-32DAF92FC469}" type="datetime1">
               <a:rPr lang="es-CO" smtClean="0"/>
-              <a:t>31/07/2018</a:t>
+              <a:t>2/08/2018</a:t>
             </a:fld>
             <a:endParaRPr lang="es-CO"/>
           </a:p>
@@ -3140,7 +3140,7 @@
           <a:p>
             <a:fld id="{FA3FB42F-D29F-4CA9-87B0-922206F8D5F8}" type="datetime1">
               <a:rPr lang="es-CO" smtClean="0"/>
-              <a:t>31/07/2018</a:t>
+              <a:t>2/08/2018</a:t>
             </a:fld>
             <a:endParaRPr lang="es-CO"/>
           </a:p>
@@ -3490,7 +3490,7 @@
           <a:p>
             <a:fld id="{2A2B69C3-9891-4BE4-9764-7F83AEDC17A0}" type="datetime1">
               <a:rPr lang="es-CO" smtClean="0"/>
-              <a:t>31/07/2018</a:t>
+              <a:t>2/08/2018</a:t>
             </a:fld>
             <a:endParaRPr lang="es-CO"/>
           </a:p>
@@ -3915,7 +3915,7 @@
           <a:p>
             <a:fld id="{2A1B9C8D-6C34-4E0F-8C0D-07BF18418F64}" type="datetime1">
               <a:rPr lang="es-CO" smtClean="0"/>
-              <a:t>31/07/2018</a:t>
+              <a:t>2/08/2018</a:t>
             </a:fld>
             <a:endParaRPr lang="es-CO"/>
           </a:p>
@@ -4196,7 +4196,7 @@
           <a:p>
             <a:fld id="{BBFFA07A-99AB-4C84-99F6-2A5A5CBA9238}" type="datetime1">
               <a:rPr lang="es-CO" smtClean="0"/>
-              <a:t>31/07/2018</a:t>
+              <a:t>2/08/2018</a:t>
             </a:fld>
             <a:endParaRPr lang="es-CO"/>
           </a:p>
@@ -6535,7 +6535,7 @@
         <p:spPr>
           <a:xfrm>
             <a:off x="5968597" y="2364753"/>
-            <a:ext cx="6096000" cy="3170099"/>
+            <a:ext cx="6096000" cy="3939540"/>
           </a:xfrm>
           <a:prstGeom prst="rect">
             <a:avLst/>
@@ -6630,6 +6630,51 @@
               <a:t>Defacement</a:t>
             </a:r>
             <a:endParaRPr lang="es-CO" sz="2500" i="1" dirty="0" smtClean="0">
+              <a:latin typeface="Berlin Sans FB" panose="020E0602020502020306" pitchFamily="34" charset="0"/>
+            </a:endParaRPr>
+          </a:p>
+          <a:p>
+            <a:pPr marL="457200" lvl="0" indent="-457200">
+              <a:buFont typeface="+mj-lt"/>
+              <a:buAutoNum type="arabicPeriod"/>
+            </a:pPr>
+            <a:r>
+              <a:rPr lang="es-CO" sz="2500" i="1" dirty="0" smtClean="0">
+                <a:latin typeface="Berlin Sans FB" panose="020E0602020502020306" pitchFamily="34" charset="0"/>
+              </a:rPr>
+              <a:t>Hacking </a:t>
+            </a:r>
+            <a:r>
+              <a:rPr lang="es-CO" sz="2500" dirty="0" smtClean="0">
+                <a:latin typeface="Berlin Sans FB" panose="020E0602020502020306" pitchFamily="34" charset="0"/>
+              </a:rPr>
+              <a:t>con hardware </a:t>
+            </a:r>
+          </a:p>
+          <a:p>
+            <a:pPr marL="457200" lvl="0" indent="-457200">
+              <a:buFont typeface="+mj-lt"/>
+              <a:buAutoNum type="arabicPeriod"/>
+            </a:pPr>
+            <a:r>
+              <a:rPr lang="es-CO" sz="2500" dirty="0" smtClean="0">
+                <a:latin typeface="Berlin Sans FB" panose="020E0602020502020306" pitchFamily="34" charset="0"/>
+              </a:rPr>
+              <a:t>Detección de mineros de </a:t>
+            </a:r>
+            <a:r>
+              <a:rPr lang="es-CO" sz="2500" dirty="0" err="1" smtClean="0">
+                <a:latin typeface="Berlin Sans FB" panose="020E0602020502020306" pitchFamily="34" charset="0"/>
+              </a:rPr>
+              <a:t>criptomonedas</a:t>
+            </a:r>
+            <a:r>
+              <a:rPr lang="es-CO" sz="2500" dirty="0" smtClean="0">
+                <a:latin typeface="Berlin Sans FB" panose="020E0602020502020306" pitchFamily="34" charset="0"/>
+              </a:rPr>
+              <a:t>. </a:t>
+            </a:r>
+            <a:endParaRPr lang="es-CO" sz="2500" dirty="0" smtClean="0">
               <a:latin typeface="Berlin Sans FB" panose="020E0602020502020306" pitchFamily="34" charset="0"/>
             </a:endParaRPr>
           </a:p>
@@ -8040,15 +8085,7 @@
             </a:r>
             <a:r>
               <a:rPr lang="es-CO" dirty="0" smtClean="0"/>
-              <a:t> es una plataforma para desarrollo colaborativo, permite crear proyectos libres o </a:t>
-            </a:r>
-            <a:r>
-              <a:rPr lang="es-CO" dirty="0" smtClean="0"/>
-              <a:t>privados. </a:t>
-            </a:r>
-            <a:r>
-              <a:rPr lang="es-CO" dirty="0" smtClean="0"/>
-              <a:t>Además, integra un gestor de versiones que facilita al desarrollo de proyectos de software. </a:t>
+              <a:t> es una plataforma para desarrollo colaborativo, permite crear proyectos libres o privados. Además, integra un gestor de versiones que facilita al desarrollo de proyectos de software. </a:t>
             </a:r>
           </a:p>
           <a:p>

</xml_diff>